<commit_message>
kleine puntjes gewijzigd in ivotum concept
</commit_message>
<xml_diff>
--- a/iVotum concept.pptx
+++ b/iVotum concept.pptx
@@ -2671,7 +2671,7 @@
           <a:graphicData uri="http://schemas.openxmlformats.org/presentationml/2006/ole">
             <mc:AlternateContent xmlns:mc="http://schemas.openxmlformats.org/markup-compatibility/2006">
               <mc:Choice xmlns:v="urn:schemas-microsoft-com:vml" Requires="v">
-                <p:oleObj spid="_x0000_s1029" name="think-cell Slide" r:id="rId11" imgW="360" imgH="360" progId="">
+                <p:oleObj spid="_x0000_s1032" name="think-cell Slide" r:id="rId11" imgW="360" imgH="360" progId="">
                   <p:embed/>
                 </p:oleObj>
               </mc:Choice>
@@ -3022,7 +3022,7 @@
           <a:graphicData uri="http://schemas.openxmlformats.org/presentationml/2006/ole">
             <mc:AlternateContent xmlns:mc="http://schemas.openxmlformats.org/markup-compatibility/2006">
               <mc:Choice xmlns:v="urn:schemas-microsoft-com:vml" Requires="v">
-                <p:oleObj spid="_x0000_s147461" name="think-cell Slide" r:id="rId7" imgW="360" imgH="360" progId="">
+                <p:oleObj spid="_x0000_s147464" name="think-cell Slide" r:id="rId7" imgW="360" imgH="360" progId="">
                   <p:embed/>
                 </p:oleObj>
               </mc:Choice>
@@ -6289,7 +6289,7 @@
           <a:graphicData uri="http://schemas.openxmlformats.org/presentationml/2006/ole">
             <mc:AlternateContent xmlns:mc="http://schemas.openxmlformats.org/markup-compatibility/2006">
               <mc:Choice xmlns:v="urn:schemas-microsoft-com:vml" Requires="v">
-                <p:oleObj spid="_x0000_s194565" name="think-cell Slide" r:id="rId7" imgW="360" imgH="360" progId="">
+                <p:oleObj spid="_x0000_s194568" name="think-cell Slide" r:id="rId7" imgW="360" imgH="360" progId="">
                   <p:embed/>
                 </p:oleObj>
               </mc:Choice>
@@ -8305,7 +8305,7 @@
           <a:graphicData uri="http://schemas.openxmlformats.org/presentationml/2006/ole">
             <mc:AlternateContent xmlns:mc="http://schemas.openxmlformats.org/markup-compatibility/2006">
               <mc:Choice xmlns:v="urn:schemas-microsoft-com:vml" Requires="v">
-                <p:oleObj spid="_x0000_s199685" name="think-cell Slide" r:id="rId6" imgW="360" imgH="360" progId="">
+                <p:oleObj spid="_x0000_s199688" name="think-cell Slide" r:id="rId6" imgW="360" imgH="360" progId="">
                   <p:embed/>
                 </p:oleObj>
               </mc:Choice>
@@ -9007,7 +9007,7 @@
           <a:graphicData uri="http://schemas.openxmlformats.org/presentationml/2006/ole">
             <mc:AlternateContent xmlns:mc="http://schemas.openxmlformats.org/markup-compatibility/2006">
               <mc:Choice xmlns:v="urn:schemas-microsoft-com:vml" Requires="v">
-                <p:oleObj spid="_x0000_s130052" name="think-cell Slide" r:id="rId5" imgW="360" imgH="360" progId="">
+                <p:oleObj spid="_x0000_s130055" name="think-cell Slide" r:id="rId5" imgW="360" imgH="360" progId="">
                   <p:embed/>
                 </p:oleObj>
               </mc:Choice>
@@ -9221,7 +9221,7 @@
           <a:graphicData uri="http://schemas.openxmlformats.org/presentationml/2006/ole">
             <mc:AlternateContent xmlns:mc="http://schemas.openxmlformats.org/markup-compatibility/2006">
               <mc:Choice xmlns:v="urn:schemas-microsoft-com:vml" Requires="v">
-                <p:oleObj spid="_x0000_s188421" name="think-cell Slide" r:id="rId5" imgW="360" imgH="360" progId="">
+                <p:oleObj spid="_x0000_s188424" name="think-cell Slide" r:id="rId5" imgW="360" imgH="360" progId="">
                   <p:embed/>
                 </p:oleObj>
               </mc:Choice>
@@ -9915,7 +9915,7 @@
           <a:graphicData uri="http://schemas.openxmlformats.org/presentationml/2006/ole">
             <mc:AlternateContent xmlns:mc="http://schemas.openxmlformats.org/markup-compatibility/2006">
               <mc:Choice xmlns:v="urn:schemas-microsoft-com:vml" Requires="v">
-                <p:oleObj spid="_x0000_s118789" name="think-cell Slide" r:id="rId6" imgW="360" imgH="360" progId="">
+                <p:oleObj spid="_x0000_s118792" name="think-cell Slide" r:id="rId6" imgW="360" imgH="360" progId="">
                   <p:embed/>
                 </p:oleObj>
               </mc:Choice>
@@ -10111,7 +10111,7 @@
           <a:graphicData uri="http://schemas.openxmlformats.org/presentationml/2006/ole">
             <mc:AlternateContent xmlns:mc="http://schemas.openxmlformats.org/markup-compatibility/2006">
               <mc:Choice xmlns:v="urn:schemas-microsoft-com:vml" Requires="v">
-                <p:oleObj spid="_x0000_s119813" name="think-cell Slide" r:id="rId7" imgW="360" imgH="360" progId="">
+                <p:oleObj spid="_x0000_s119816" name="think-cell Slide" r:id="rId7" imgW="360" imgH="360" progId="">
                   <p:embed/>
                 </p:oleObj>
               </mc:Choice>
@@ -10359,7 +10359,7 @@
           <a:graphicData uri="http://schemas.openxmlformats.org/presentationml/2006/ole">
             <mc:AlternateContent xmlns:mc="http://schemas.openxmlformats.org/markup-compatibility/2006">
               <mc:Choice xmlns:v="urn:schemas-microsoft-com:vml" Requires="v">
-                <p:oleObj spid="_x0000_s123908" name="think-cell Slide" r:id="rId7" imgW="360" imgH="360" progId="">
+                <p:oleObj spid="_x0000_s123911" name="think-cell Slide" r:id="rId7" imgW="360" imgH="360" progId="">
                   <p:embed/>
                 </p:oleObj>
               </mc:Choice>
@@ -10600,7 +10600,7 @@
           <a:graphicData uri="http://schemas.openxmlformats.org/presentationml/2006/ole">
             <mc:AlternateContent xmlns:mc="http://schemas.openxmlformats.org/markup-compatibility/2006">
               <mc:Choice xmlns:v="urn:schemas-microsoft-com:vml" Requires="v">
-                <p:oleObj spid="_x0000_s122884" name="think-cell Slide" r:id="rId9" imgW="360" imgH="360" progId="">
+                <p:oleObj spid="_x0000_s122887" name="think-cell Slide" r:id="rId9" imgW="360" imgH="360" progId="">
                   <p:embed/>
                 </p:oleObj>
               </mc:Choice>
@@ -11794,7 +11794,7 @@
           <a:graphicData uri="http://schemas.openxmlformats.org/presentationml/2006/ole">
             <mc:AlternateContent xmlns:mc="http://schemas.openxmlformats.org/markup-compatibility/2006">
               <mc:Choice xmlns:v="urn:schemas-microsoft-com:vml" Requires="v">
-                <p:oleObj spid="_x0000_s121860" name="think-cell Slide" r:id="rId5" imgW="360" imgH="360" progId="">
+                <p:oleObj spid="_x0000_s121863" name="think-cell Slide" r:id="rId5" imgW="360" imgH="360" progId="">
                   <p:embed/>
                 </p:oleObj>
               </mc:Choice>
@@ -11923,7 +11923,7 @@
           <a:graphicData uri="http://schemas.openxmlformats.org/presentationml/2006/ole">
             <mc:AlternateContent xmlns:mc="http://schemas.openxmlformats.org/markup-compatibility/2006">
               <mc:Choice xmlns:v="urn:schemas-microsoft-com:vml" Requires="v">
-                <p:oleObj spid="_x0000_s76804" name="think-cell Slide" r:id="rId4" imgW="360" imgH="360" progId="">
+                <p:oleObj spid="_x0000_s76807" name="think-cell Slide" r:id="rId4" imgW="360" imgH="360" progId="">
                   <p:embed/>
                 </p:oleObj>
               </mc:Choice>
@@ -12034,7 +12034,7 @@
           <a:graphicData uri="http://schemas.openxmlformats.org/presentationml/2006/ole">
             <mc:AlternateContent xmlns:mc="http://schemas.openxmlformats.org/markup-compatibility/2006">
               <mc:Choice xmlns:v="urn:schemas-microsoft-com:vml" Requires="v">
-                <p:oleObj spid="_x0000_s2052" name="think-cell Slide" r:id="rId20" imgW="360" imgH="360" progId="">
+                <p:oleObj spid="_x0000_s2055" name="think-cell Slide" r:id="rId20" imgW="360" imgH="360" progId="">
                   <p:embed/>
                 </p:oleObj>
               </mc:Choice>
@@ -12911,7 +12911,7 @@
           <a:graphicData uri="http://schemas.openxmlformats.org/presentationml/2006/ole">
             <mc:AlternateContent xmlns:mc="http://schemas.openxmlformats.org/markup-compatibility/2006">
               <mc:Choice xmlns:v="urn:schemas-microsoft-com:vml" Requires="v">
-                <p:oleObj spid="_x0000_s129028" name="think-cell Slide" r:id="rId6" imgW="360" imgH="360" progId="">
+                <p:oleObj spid="_x0000_s129031" name="think-cell Slide" r:id="rId6" imgW="360" imgH="360" progId="">
                   <p:embed/>
                 </p:oleObj>
               </mc:Choice>
@@ -13267,7 +13267,7 @@
           <a:graphicData uri="http://schemas.openxmlformats.org/presentationml/2006/ole">
             <mc:AlternateContent xmlns:mc="http://schemas.openxmlformats.org/markup-compatibility/2006">
               <mc:Choice xmlns:v="urn:schemas-microsoft-com:vml" Requires="v">
-                <p:oleObj spid="_x0000_s133124" name="think-cell Slide" r:id="rId14" imgW="360" imgH="360" progId="">
+                <p:oleObj spid="_x0000_s133127" name="think-cell Slide" r:id="rId14" imgW="360" imgH="360" progId="">
                   <p:embed/>
                 </p:oleObj>
               </mc:Choice>
@@ -17051,11 +17051,7 @@
           <a:p>
             <a:r>
               <a:rPr lang="en-US" dirty="0" smtClean="0"/>
-              <a:t>Concept </a:t>
-            </a:r>
-            <a:r>
-              <a:rPr lang="en-US" dirty="0" err="1" smtClean="0"/>
-              <a:t>Architectuur</a:t>
+              <a:t>iVotum</a:t>
             </a:r>
             <a:endParaRPr lang="en-US" dirty="0" smtClean="0"/>
           </a:p>
@@ -17112,7 +17108,7 @@
           <a:graphicData uri="http://schemas.openxmlformats.org/presentationml/2006/ole">
             <mc:AlternateContent xmlns:mc="http://schemas.openxmlformats.org/markup-compatibility/2006">
               <mc:Choice xmlns:v="urn:schemas-microsoft-com:vml" Requires="v">
-                <p:oleObj spid="_x0000_s137232" name="think-cell Slide" r:id="rId5" imgW="360" imgH="360" progId="">
+                <p:oleObj spid="_x0000_s137235" name="think-cell Slide" r:id="rId5" imgW="360" imgH="360" progId="">
                   <p:embed/>
                 </p:oleObj>
               </mc:Choice>
@@ -17382,6 +17378,108 @@
           <a:xfrm>
             <a:off x="633986" y="1247775"/>
             <a:ext cx="863586" cy="863586"/>
+          </a:xfrm>
+          <a:prstGeom prst="rect">
+            <a:avLst/>
+          </a:prstGeom>
+        </p:spPr>
+      </p:pic>
+      <p:pic>
+        <p:nvPicPr>
+          <p:cNvPr id="3" name="Picture 2"/>
+          <p:cNvPicPr>
+            <a:picLocks noChangeAspect="1"/>
+          </p:cNvPicPr>
+          <p:nvPr/>
+        </p:nvPicPr>
+        <p:blipFill>
+          <a:blip r:embed="rId12" cstate="print">
+            <a:extLst>
+              <a:ext uri="{28A0092B-C50C-407E-A947-70E740481C1C}">
+                <a14:useLocalDpi xmlns:a14="http://schemas.microsoft.com/office/drawing/2010/main" val="0"/>
+              </a:ext>
+            </a:extLst>
+          </a:blip>
+          <a:stretch>
+            <a:fillRect/>
+          </a:stretch>
+        </p:blipFill>
+        <p:spPr>
+          <a:xfrm>
+            <a:off x="8018526" y="5322944"/>
+            <a:ext cx="680188" cy="680188"/>
+          </a:xfrm>
+          <a:prstGeom prst="rect">
+            <a:avLst/>
+          </a:prstGeom>
+        </p:spPr>
+      </p:pic>
+      <p:sp>
+        <p:nvSpPr>
+          <p:cNvPr id="5" name="TextBox 4"/>
+          <p:cNvSpPr txBox="1"/>
+          <p:nvPr/>
+        </p:nvSpPr>
+        <p:spPr>
+          <a:xfrm>
+            <a:off x="8595197" y="5397006"/>
+            <a:ext cx="1233577" cy="369332"/>
+          </a:xfrm>
+          <a:prstGeom prst="rect">
+            <a:avLst/>
+          </a:prstGeom>
+          <a:noFill/>
+        </p:spPr>
+        <p:txBody>
+          <a:bodyPr wrap="square" rtlCol="0">
+            <a:spAutoFit/>
+          </a:bodyPr>
+          <a:lstStyle/>
+          <a:p>
+            <a:r>
+              <a:rPr lang="en-GB" sz="1800" dirty="0" err="1" smtClean="0">
+                <a:solidFill>
+                  <a:schemeClr val="tx2">
+                    <a:lumMod val="50000"/>
+                  </a:schemeClr>
+                </a:solidFill>
+              </a:rPr>
+              <a:t>iVotum</a:t>
+            </a:r>
+            <a:endParaRPr lang="en-GB" sz="1800" dirty="0" smtClean="0">
+              <a:solidFill>
+                <a:schemeClr val="tx2">
+                  <a:lumMod val="50000"/>
+                </a:schemeClr>
+              </a:solidFill>
+            </a:endParaRPr>
+          </a:p>
+        </p:txBody>
+      </p:sp>
+      <p:pic>
+        <p:nvPicPr>
+          <p:cNvPr id="7" name="Picture 6"/>
+          <p:cNvPicPr>
+            <a:picLocks noChangeAspect="1"/>
+          </p:cNvPicPr>
+          <p:nvPr/>
+        </p:nvPicPr>
+        <p:blipFill>
+          <a:blip r:embed="rId13" cstate="print">
+            <a:extLst>
+              <a:ext uri="{28A0092B-C50C-407E-A947-70E740481C1C}">
+                <a14:useLocalDpi xmlns:a14="http://schemas.microsoft.com/office/drawing/2010/main" val="0"/>
+              </a:ext>
+            </a:extLst>
+          </a:blip>
+          <a:stretch>
+            <a:fillRect/>
+          </a:stretch>
+        </p:blipFill>
+        <p:spPr>
+          <a:xfrm>
+            <a:off x="7978408" y="4657397"/>
+            <a:ext cx="616789" cy="616789"/>
           </a:xfrm>
           <a:prstGeom prst="rect">
             <a:avLst/>

</xml_diff>